<commit_message>
Add edge service skeleton
</commit_message>
<xml_diff>
--- a/doc/flow_based_programming.pptx
+++ b/doc/flow_based_programming.pptx
@@ -265,7 +265,7 @@
           <a:p>
             <a:fld id="{BD01BFE4-158D-434D-A090-6C8C9FD01481}" type="datetimeFigureOut">
               <a:rPr lang="en-US" smtClean="0"/>
-              <a:t>8/3/2017</a:t>
+              <a:t>8/5/2017</a:t>
             </a:fld>
             <a:endParaRPr lang="en-US"/>
           </a:p>
@@ -497,7 +497,7 @@
           <a:p>
             <a:fld id="{BD01BFE4-158D-434D-A090-6C8C9FD01481}" type="datetimeFigureOut">
               <a:rPr lang="en-US" smtClean="0"/>
-              <a:t>8/3/2017</a:t>
+              <a:t>8/5/2017</a:t>
             </a:fld>
             <a:endParaRPr lang="en-US"/>
           </a:p>
@@ -739,7 +739,7 @@
           <a:p>
             <a:fld id="{BD01BFE4-158D-434D-A090-6C8C9FD01481}" type="datetimeFigureOut">
               <a:rPr lang="en-US" smtClean="0"/>
-              <a:t>8/3/2017</a:t>
+              <a:t>8/5/2017</a:t>
             </a:fld>
             <a:endParaRPr lang="en-US"/>
           </a:p>
@@ -971,7 +971,7 @@
           <a:p>
             <a:fld id="{BD01BFE4-158D-434D-A090-6C8C9FD01481}" type="datetimeFigureOut">
               <a:rPr lang="en-US" smtClean="0"/>
-              <a:t>8/3/2017</a:t>
+              <a:t>8/5/2017</a:t>
             </a:fld>
             <a:endParaRPr lang="en-US"/>
           </a:p>
@@ -1247,7 +1247,7 @@
           <a:p>
             <a:fld id="{BD01BFE4-158D-434D-A090-6C8C9FD01481}" type="datetimeFigureOut">
               <a:rPr lang="en-US" smtClean="0"/>
-              <a:t>8/3/2017</a:t>
+              <a:t>8/5/2017</a:t>
             </a:fld>
             <a:endParaRPr lang="en-US"/>
           </a:p>
@@ -1579,7 +1579,7 @@
           <a:p>
             <a:fld id="{BD01BFE4-158D-434D-A090-6C8C9FD01481}" type="datetimeFigureOut">
               <a:rPr lang="en-US" smtClean="0"/>
-              <a:t>8/3/2017</a:t>
+              <a:t>8/5/2017</a:t>
             </a:fld>
             <a:endParaRPr lang="en-US"/>
           </a:p>
@@ -2058,7 +2058,7 @@
           <a:p>
             <a:fld id="{BD01BFE4-158D-434D-A090-6C8C9FD01481}" type="datetimeFigureOut">
               <a:rPr lang="en-US" smtClean="0"/>
-              <a:t>8/3/2017</a:t>
+              <a:t>8/5/2017</a:t>
             </a:fld>
             <a:endParaRPr lang="en-US"/>
           </a:p>
@@ -2200,7 +2200,7 @@
           <a:p>
             <a:fld id="{BD01BFE4-158D-434D-A090-6C8C9FD01481}" type="datetimeFigureOut">
               <a:rPr lang="en-US" smtClean="0"/>
-              <a:t>8/3/2017</a:t>
+              <a:t>8/5/2017</a:t>
             </a:fld>
             <a:endParaRPr lang="en-US"/>
           </a:p>
@@ -2313,7 +2313,7 @@
           <a:p>
             <a:fld id="{BD01BFE4-158D-434D-A090-6C8C9FD01481}" type="datetimeFigureOut">
               <a:rPr lang="en-US" smtClean="0"/>
-              <a:t>8/3/2017</a:t>
+              <a:t>8/5/2017</a:t>
             </a:fld>
             <a:endParaRPr lang="en-US"/>
           </a:p>
@@ -2658,7 +2658,7 @@
           <a:p>
             <a:fld id="{BD01BFE4-158D-434D-A090-6C8C9FD01481}" type="datetimeFigureOut">
               <a:rPr lang="en-US" smtClean="0"/>
-              <a:t>8/3/2017</a:t>
+              <a:t>8/5/2017</a:t>
             </a:fld>
             <a:endParaRPr lang="en-US"/>
           </a:p>
@@ -2947,7 +2947,7 @@
           <a:p>
             <a:fld id="{BD01BFE4-158D-434D-A090-6C8C9FD01481}" type="datetimeFigureOut">
               <a:rPr lang="en-US" smtClean="0"/>
-              <a:t>8/3/2017</a:t>
+              <a:t>8/5/2017</a:t>
             </a:fld>
             <a:endParaRPr lang="en-US"/>
           </a:p>
@@ -3222,7 +3222,7 @@
           <a:p>
             <a:fld id="{BD01BFE4-158D-434D-A090-6C8C9FD01481}" type="datetimeFigureOut">
               <a:rPr lang="en-US" smtClean="0"/>
-              <a:t>8/3/2017</a:t>
+              <a:t>8/5/2017</a:t>
             </a:fld>
             <a:endParaRPr lang="en-US"/>
           </a:p>
@@ -3818,7 +3818,7 @@
         </p:nvSpPr>
         <p:spPr>
           <a:xfrm>
-            <a:off x="240145" y="5735765"/>
+            <a:off x="240145" y="5283185"/>
             <a:ext cx="1071419" cy="683491"/>
           </a:xfrm>
           <a:prstGeom prst="roundRect">
@@ -3873,7 +3873,7 @@
         </p:nvSpPr>
         <p:spPr>
           <a:xfrm>
-            <a:off x="1565565" y="5735764"/>
+            <a:off x="1565565" y="5283184"/>
             <a:ext cx="1071419" cy="683491"/>
           </a:xfrm>
           <a:prstGeom prst="roundRect">
@@ -3928,7 +3928,7 @@
         </p:nvSpPr>
         <p:spPr>
           <a:xfrm>
-            <a:off x="2872514" y="5735764"/>
+            <a:off x="2872514" y="5283184"/>
             <a:ext cx="1071419" cy="683491"/>
           </a:xfrm>
           <a:prstGeom prst="roundRect">
@@ -3983,7 +3983,7 @@
         </p:nvSpPr>
         <p:spPr>
           <a:xfrm>
-            <a:off x="3796144" y="4271800"/>
+            <a:off x="3796144" y="3819220"/>
             <a:ext cx="1071419" cy="683491"/>
           </a:xfrm>
           <a:prstGeom prst="roundRect">
@@ -4038,7 +4038,7 @@
         </p:nvSpPr>
         <p:spPr>
           <a:xfrm>
-            <a:off x="5352470" y="4271800"/>
+            <a:off x="5352470" y="3819220"/>
             <a:ext cx="1071419" cy="683491"/>
           </a:xfrm>
           <a:prstGeom prst="roundRect">
@@ -4071,14 +4071,14 @@
             <a:pPr algn="ctr"/>
             <a:r>
               <a:rPr lang="en-US" dirty="0"/>
-              <a:t>Driver</a:t>
+              <a:t>CLI</a:t>
             </a:r>
           </a:p>
           <a:p>
             <a:pPr algn="ctr"/>
             <a:r>
               <a:rPr lang="en-US" dirty="0"/>
-              <a:t>Service</a:t>
+              <a:t>Activity</a:t>
             </a:r>
           </a:p>
         </p:txBody>
@@ -4097,7 +4097,7 @@
         </p:nvSpPr>
         <p:spPr>
           <a:xfrm>
-            <a:off x="7084295" y="4336463"/>
+            <a:off x="7084295" y="3883883"/>
             <a:ext cx="609600" cy="558801"/>
           </a:xfrm>
           <a:prstGeom prst="ellipse">
@@ -4140,67 +4140,6 @@
           </a:p>
         </p:txBody>
       </p:sp>
-      <p:sp>
-        <p:nvSpPr>
-          <p:cNvPr id="15" name="四角形: 角を丸くする 14">
-            <a:extLst>
-              <a:ext uri="{FF2B5EF4-FFF2-40B4-BE49-F238E27FC236}">
-                <a16:creationId xmlns:a16="http://schemas.microsoft.com/office/drawing/2014/main" id="{C5CD6721-3E05-420A-9014-DA335E477CED}"/>
-              </a:ext>
-            </a:extLst>
-          </p:cNvPr>
-          <p:cNvSpPr/>
-          <p:nvPr/>
-        </p:nvSpPr>
-        <p:spPr>
-          <a:xfrm>
-            <a:off x="10760372" y="2297541"/>
-            <a:ext cx="1071419" cy="683491"/>
-          </a:xfrm>
-          <a:prstGeom prst="roundRect">
-            <a:avLst/>
-          </a:prstGeom>
-          <a:solidFill>
-            <a:schemeClr val="accent4">
-              <a:lumMod val="75000"/>
-            </a:schemeClr>
-          </a:solidFill>
-        </p:spPr>
-        <p:style>
-          <a:lnRef idx="2">
-            <a:schemeClr val="accent1">
-              <a:shade val="50000"/>
-            </a:schemeClr>
-          </a:lnRef>
-          <a:fillRef idx="1">
-            <a:schemeClr val="accent1"/>
-          </a:fillRef>
-          <a:effectRef idx="0">
-            <a:schemeClr val="accent1"/>
-          </a:effectRef>
-          <a:fontRef idx="minor">
-            <a:schemeClr val="lt1"/>
-          </a:fontRef>
-        </p:style>
-        <p:txBody>
-          <a:bodyPr rtlCol="0" anchor="ctr"/>
-          <a:lstStyle/>
-          <a:p>
-            <a:pPr algn="ctr"/>
-            <a:r>
-              <a:rPr lang="en-US" dirty="0"/>
-              <a:t>DB</a:t>
-            </a:r>
-          </a:p>
-          <a:p>
-            <a:pPr algn="ctr"/>
-            <a:r>
-              <a:rPr lang="en-US" dirty="0"/>
-              <a:t>server</a:t>
-            </a:r>
-          </a:p>
-        </p:txBody>
-      </p:sp>
       <p:cxnSp>
         <p:nvCxnSpPr>
           <p:cNvPr id="17" name="コネクタ: カギ線 16">
@@ -4218,7 +4157,7 @@
         </p:nvCxnSpPr>
         <p:spPr>
           <a:xfrm rot="5400000" flipH="1" flipV="1">
-            <a:off x="1724890" y="3664512"/>
+            <a:off x="1724890" y="3211932"/>
             <a:ext cx="1122219" cy="3020289"/>
           </a:xfrm>
           <a:prstGeom prst="bentConnector2">
@@ -4261,7 +4200,7 @@
         </p:nvCxnSpPr>
         <p:spPr>
           <a:xfrm rot="5400000" flipH="1" flipV="1">
-            <a:off x="2387600" y="4327221"/>
+            <a:off x="2387600" y="3874641"/>
             <a:ext cx="1122218" cy="1694869"/>
           </a:xfrm>
           <a:prstGeom prst="bentConnector2">
@@ -4304,7 +4243,7 @@
         </p:nvCxnSpPr>
         <p:spPr>
           <a:xfrm rot="5400000">
-            <a:off x="3479803" y="4883712"/>
+            <a:off x="3479803" y="4431132"/>
             <a:ext cx="780473" cy="923630"/>
           </a:xfrm>
           <a:prstGeom prst="bentConnector3">
@@ -4348,7 +4287,7 @@
         </p:nvCxnSpPr>
         <p:spPr>
           <a:xfrm>
-            <a:off x="4867563" y="4613546"/>
+            <a:off x="4867563" y="4160966"/>
             <a:ext cx="484907" cy="0"/>
           </a:xfrm>
           <a:prstGeom prst="straightConnector1">
@@ -4391,7 +4330,7 @@
         </p:nvCxnSpPr>
         <p:spPr>
           <a:xfrm>
-            <a:off x="6423889" y="4613546"/>
+            <a:off x="6423889" y="4160966"/>
             <a:ext cx="660406" cy="2318"/>
           </a:xfrm>
           <a:prstGeom prst="straightConnector1">
@@ -4430,7 +4369,7 @@
         </p:nvSpPr>
         <p:spPr>
           <a:xfrm>
-            <a:off x="8279538" y="5974692"/>
+            <a:off x="5389397" y="5300798"/>
             <a:ext cx="1071419" cy="683491"/>
           </a:xfrm>
           <a:prstGeom prst="roundRect">
@@ -4466,6 +4405,13 @@
               <a:t>Visualizer</a:t>
             </a:r>
           </a:p>
+          <a:p>
+            <a:pPr algn="ctr"/>
+            <a:r>
+              <a:rPr lang="en-US" sz="1600" dirty="0"/>
+              <a:t>Activity</a:t>
+            </a:r>
+          </a:p>
         </p:txBody>
       </p:sp>
       <p:sp>
@@ -4482,7 +4428,7 @@
         </p:nvSpPr>
         <p:spPr>
           <a:xfrm>
-            <a:off x="8261930" y="4274116"/>
+            <a:off x="8261930" y="3821536"/>
             <a:ext cx="1071419" cy="683491"/>
           </a:xfrm>
           <a:prstGeom prst="roundRect">
@@ -4545,7 +4491,7 @@
         </p:nvCxnSpPr>
         <p:spPr>
           <a:xfrm rot="5400000">
-            <a:off x="7961748" y="4698991"/>
+            <a:off x="7961748" y="4246411"/>
             <a:ext cx="577276" cy="1094509"/>
           </a:xfrm>
           <a:prstGeom prst="bentConnector2">
@@ -4584,7 +4530,7 @@
         </p:nvSpPr>
         <p:spPr>
           <a:xfrm>
-            <a:off x="7093531" y="5255482"/>
+            <a:off x="7093531" y="4802902"/>
             <a:ext cx="609600" cy="558801"/>
           </a:xfrm>
           <a:prstGeom prst="ellipse">
@@ -4645,7 +4591,7 @@
         </p:nvCxnSpPr>
         <p:spPr>
           <a:xfrm rot="10800000">
-            <a:off x="5888181" y="4955291"/>
+            <a:off x="5888181" y="4502711"/>
             <a:ext cx="1205351" cy="579592"/>
           </a:xfrm>
           <a:prstGeom prst="bentConnector2">
@@ -4688,7 +4634,7 @@
         </p:nvCxnSpPr>
         <p:spPr>
           <a:xfrm rot="16200000" flipV="1">
-            <a:off x="5110017" y="3493637"/>
+            <a:off x="5110017" y="3041057"/>
             <a:ext cx="12700" cy="1556326"/>
           </a:xfrm>
           <a:prstGeom prst="bentConnector3">
@@ -4729,7 +4675,7 @@
         </p:nvSpPr>
         <p:spPr>
           <a:xfrm>
-            <a:off x="10760372" y="3314697"/>
+            <a:off x="10759668" y="2058825"/>
             <a:ext cx="1071419" cy="1315029"/>
           </a:xfrm>
           <a:prstGeom prst="flowChartMagneticDisk">
@@ -4795,51 +4741,8 @@
         </p:nvCxnSpPr>
         <p:spPr>
           <a:xfrm flipV="1">
-            <a:off x="7693895" y="4615862"/>
+            <a:off x="7693895" y="4163282"/>
             <a:ext cx="568035" cy="2"/>
-          </a:xfrm>
-          <a:prstGeom prst="straightConnector1">
-            <a:avLst/>
-          </a:prstGeom>
-          <a:ln w="76200">
-            <a:tailEnd type="triangle"/>
-          </a:ln>
-        </p:spPr>
-        <p:style>
-          <a:lnRef idx="1">
-            <a:schemeClr val="accent1"/>
-          </a:lnRef>
-          <a:fillRef idx="0">
-            <a:schemeClr val="accent1"/>
-          </a:fillRef>
-          <a:effectRef idx="0">
-            <a:schemeClr val="accent1"/>
-          </a:effectRef>
-          <a:fontRef idx="minor">
-            <a:schemeClr val="tx1"/>
-          </a:fontRef>
-        </p:style>
-      </p:cxnSp>
-      <p:cxnSp>
-        <p:nvCxnSpPr>
-          <p:cNvPr id="161" name="直線矢印コネクタ 160">
-            <a:extLst>
-              <a:ext uri="{FF2B5EF4-FFF2-40B4-BE49-F238E27FC236}">
-                <a16:creationId xmlns:a16="http://schemas.microsoft.com/office/drawing/2014/main" id="{D6BA235E-A670-47EA-B983-6018B8D5A2EE}"/>
-              </a:ext>
-            </a:extLst>
-          </p:cNvPr>
-          <p:cNvCxnSpPr>
-            <a:cxnSpLocks/>
-            <a:stCxn id="15" idx="2"/>
-            <a:endCxn id="147" idx="1"/>
-          </p:cNvCxnSpPr>
-          <p:nvPr/>
-        </p:nvCxnSpPr>
-        <p:spPr>
-          <a:xfrm>
-            <a:off x="11296082" y="2981032"/>
-            <a:ext cx="0" cy="333665"/>
           </a:xfrm>
           <a:prstGeom prst="straightConnector1">
             <a:avLst/>
@@ -5028,110 +4931,6 @@
       </p:sp>
       <p:sp>
         <p:nvSpPr>
-          <p:cNvPr id="42" name="四角形: 角を丸くする 41">
-            <a:extLst>
-              <a:ext uri="{FF2B5EF4-FFF2-40B4-BE49-F238E27FC236}">
-                <a16:creationId xmlns:a16="http://schemas.microsoft.com/office/drawing/2014/main" id="{F96616CB-8B39-445D-8FCF-A0666782F262}"/>
-              </a:ext>
-            </a:extLst>
-          </p:cNvPr>
-          <p:cNvSpPr/>
-          <p:nvPr/>
-        </p:nvSpPr>
-        <p:spPr>
-          <a:xfrm>
-            <a:off x="7093510" y="1539069"/>
-            <a:ext cx="1071419" cy="683491"/>
-          </a:xfrm>
-          <a:prstGeom prst="roundRect">
-            <a:avLst/>
-          </a:prstGeom>
-          <a:solidFill>
-            <a:srgbClr val="00B050"/>
-          </a:solidFill>
-        </p:spPr>
-        <p:style>
-          <a:lnRef idx="2">
-            <a:schemeClr val="accent1">
-              <a:shade val="50000"/>
-            </a:schemeClr>
-          </a:lnRef>
-          <a:fillRef idx="1">
-            <a:schemeClr val="accent1"/>
-          </a:fillRef>
-          <a:effectRef idx="0">
-            <a:schemeClr val="accent1"/>
-          </a:effectRef>
-          <a:fontRef idx="minor">
-            <a:schemeClr val="lt1"/>
-          </a:fontRef>
-        </p:style>
-        <p:txBody>
-          <a:bodyPr rtlCol="0" anchor="ctr"/>
-          <a:lstStyle/>
-          <a:p>
-            <a:pPr algn="ctr"/>
-            <a:r>
-              <a:rPr lang="en-US" sz="1600" dirty="0"/>
-              <a:t>Manager</a:t>
-            </a:r>
-          </a:p>
-        </p:txBody>
-      </p:sp>
-      <p:sp>
-        <p:nvSpPr>
-          <p:cNvPr id="9" name="矢印: 下 8">
-            <a:extLst>
-              <a:ext uri="{FF2B5EF4-FFF2-40B4-BE49-F238E27FC236}">
-                <a16:creationId xmlns:a16="http://schemas.microsoft.com/office/drawing/2014/main" id="{E4A8CE6A-1625-4F27-92F8-53FA0D00D888}"/>
-              </a:ext>
-            </a:extLst>
-          </p:cNvPr>
-          <p:cNvSpPr/>
-          <p:nvPr/>
-        </p:nvSpPr>
-        <p:spPr>
-          <a:xfrm>
-            <a:off x="7509168" y="2290621"/>
-            <a:ext cx="304800" cy="563418"/>
-          </a:xfrm>
-          <a:prstGeom prst="downArrow">
-            <a:avLst/>
-          </a:prstGeom>
-          <a:solidFill>
-            <a:schemeClr val="tx2">
-              <a:lumMod val="60000"/>
-              <a:lumOff val="40000"/>
-            </a:schemeClr>
-          </a:solidFill>
-        </p:spPr>
-        <p:style>
-          <a:lnRef idx="2">
-            <a:schemeClr val="accent1">
-              <a:shade val="50000"/>
-            </a:schemeClr>
-          </a:lnRef>
-          <a:fillRef idx="1">
-            <a:schemeClr val="accent1"/>
-          </a:fillRef>
-          <a:effectRef idx="0">
-            <a:schemeClr val="accent1"/>
-          </a:effectRef>
-          <a:fontRef idx="minor">
-            <a:schemeClr val="lt1"/>
-          </a:fontRef>
-        </p:style>
-        <p:txBody>
-          <a:bodyPr rtlCol="0" anchor="ctr"/>
-          <a:lstStyle/>
-          <a:p>
-            <a:pPr algn="ctr"/>
-            <a:endParaRPr lang="en-US"/>
-          </a:p>
-        </p:txBody>
-      </p:sp>
-      <p:sp>
-        <p:nvSpPr>
           <p:cNvPr id="46" name="テキスト ボックス 45">
             <a:extLst>
               <a:ext uri="{FF2B5EF4-FFF2-40B4-BE49-F238E27FC236}">
@@ -5175,58 +4974,6 @@
           </a:p>
         </p:txBody>
       </p:sp>
-      <p:sp>
-        <p:nvSpPr>
-          <p:cNvPr id="50" name="四角形: 角を丸くする 49">
-            <a:extLst>
-              <a:ext uri="{FF2B5EF4-FFF2-40B4-BE49-F238E27FC236}">
-                <a16:creationId xmlns:a16="http://schemas.microsoft.com/office/drawing/2014/main" id="{00632BAD-6D07-4FC3-A3E7-F545AF6CDEEC}"/>
-              </a:ext>
-            </a:extLst>
-          </p:cNvPr>
-          <p:cNvSpPr/>
-          <p:nvPr/>
-        </p:nvSpPr>
-        <p:spPr>
-          <a:xfrm>
-            <a:off x="5360843" y="2879995"/>
-            <a:ext cx="1071419" cy="683491"/>
-          </a:xfrm>
-          <a:prstGeom prst="roundRect">
-            <a:avLst/>
-          </a:prstGeom>
-          <a:solidFill>
-            <a:srgbClr val="92D050"/>
-          </a:solidFill>
-        </p:spPr>
-        <p:style>
-          <a:lnRef idx="2">
-            <a:schemeClr val="accent1">
-              <a:shade val="50000"/>
-            </a:schemeClr>
-          </a:lnRef>
-          <a:fillRef idx="1">
-            <a:schemeClr val="accent1"/>
-          </a:fillRef>
-          <a:effectRef idx="0">
-            <a:schemeClr val="accent1"/>
-          </a:effectRef>
-          <a:fontRef idx="minor">
-            <a:schemeClr val="lt1"/>
-          </a:fontRef>
-        </p:style>
-        <p:txBody>
-          <a:bodyPr rtlCol="0" anchor="ctr"/>
-          <a:lstStyle/>
-          <a:p>
-            <a:pPr algn="ctr"/>
-            <a:r>
-              <a:rPr lang="en-US" dirty="0"/>
-              <a:t>CLI</a:t>
-            </a:r>
-          </a:p>
-        </p:txBody>
-      </p:sp>
       <p:cxnSp>
         <p:nvCxnSpPr>
           <p:cNvPr id="56" name="コネクタ: カギ線 55">
@@ -5239,57 +4986,13 @@
           <p:cNvCxnSpPr>
             <a:cxnSpLocks/>
             <a:stCxn id="104" idx="0"/>
-            <a:endCxn id="15" idx="1"/>
           </p:cNvCxnSpPr>
           <p:nvPr/>
         </p:nvCxnSpPr>
         <p:spPr>
           <a:xfrm rot="5400000" flipH="1" flipV="1">
-            <a:off x="8961592" y="2475336"/>
-            <a:ext cx="1634829" cy="1962732"/>
-          </a:xfrm>
-          <a:prstGeom prst="bentConnector2">
-            <a:avLst/>
-          </a:prstGeom>
-          <a:ln w="76200">
-            <a:tailEnd type="triangle"/>
-          </a:ln>
-        </p:spPr>
-        <p:style>
-          <a:lnRef idx="1">
-            <a:schemeClr val="accent1"/>
-          </a:lnRef>
-          <a:fillRef idx="0">
-            <a:schemeClr val="accent1"/>
-          </a:fillRef>
-          <a:effectRef idx="0">
-            <a:schemeClr val="accent1"/>
-          </a:effectRef>
-          <a:fontRef idx="minor">
-            <a:schemeClr val="tx1"/>
-          </a:fontRef>
-        </p:style>
-      </p:cxnSp>
-      <p:cxnSp>
-        <p:nvCxnSpPr>
-          <p:cNvPr id="67" name="コネクタ: カギ線 66">
-            <a:extLst>
-              <a:ext uri="{FF2B5EF4-FFF2-40B4-BE49-F238E27FC236}">
-                <a16:creationId xmlns:a16="http://schemas.microsoft.com/office/drawing/2014/main" id="{D0FC2571-E134-49BD-8F15-869E1237305E}"/>
-              </a:ext>
-            </a:extLst>
-          </p:cNvPr>
-          <p:cNvCxnSpPr>
-            <a:cxnSpLocks/>
-            <a:stCxn id="13" idx="0"/>
-            <a:endCxn id="50" idx="3"/>
-          </p:cNvCxnSpPr>
-          <p:nvPr/>
-        </p:nvCxnSpPr>
-        <p:spPr>
-          <a:xfrm rot="16200000" flipV="1">
-            <a:off x="6353318" y="3300685"/>
-            <a:ext cx="1114722" cy="956833"/>
+            <a:off x="9246284" y="2308152"/>
+            <a:ext cx="1064740" cy="1962028"/>
           </a:xfrm>
           <a:prstGeom prst="bentConnector2">
             <a:avLst/>
@@ -5325,14 +5028,14 @@
           <p:cNvCxnSpPr>
             <a:cxnSpLocks/>
             <a:stCxn id="119" idx="4"/>
-            <a:endCxn id="60" idx="1"/>
+            <a:endCxn id="60" idx="3"/>
           </p:cNvCxnSpPr>
           <p:nvPr/>
         </p:nvCxnSpPr>
         <p:spPr>
-          <a:xfrm rot="16200000" flipH="1">
-            <a:off x="7587857" y="5624756"/>
-            <a:ext cx="502155" cy="881207"/>
+          <a:xfrm rot="5400000">
+            <a:off x="6789154" y="5033366"/>
+            <a:ext cx="280841" cy="937515"/>
           </a:xfrm>
           <a:prstGeom prst="bentConnector2">
             <a:avLst/>
@@ -5358,10 +5061,10 @@
       </p:cxnSp>
       <p:cxnSp>
         <p:nvCxnSpPr>
-          <p:cNvPr id="53" name="直線コネクタ 52">
-            <a:extLst>
-              <a:ext uri="{FF2B5EF4-FFF2-40B4-BE49-F238E27FC236}">
-                <a16:creationId xmlns:a16="http://schemas.microsoft.com/office/drawing/2014/main" id="{4037C5E2-9A42-411E-961D-4616EE7F9CB6}"/>
+          <p:cNvPr id="41" name="直線コネクタ 40">
+            <a:extLst>
+              <a:ext uri="{FF2B5EF4-FFF2-40B4-BE49-F238E27FC236}">
+                <a16:creationId xmlns:a16="http://schemas.microsoft.com/office/drawing/2014/main" id="{C76DC92C-024F-4FDC-9585-0E0D39E48F0D}"/>
               </a:ext>
             </a:extLst>
           </p:cNvPr>
@@ -5369,13 +5072,16 @@
           <p:nvPr/>
         </p:nvCxnSpPr>
         <p:spPr>
-          <a:xfrm>
-            <a:off x="6206836" y="3563486"/>
-            <a:ext cx="0" cy="701963"/>
+          <a:xfrm flipV="1">
+            <a:off x="6243782" y="3315856"/>
+            <a:ext cx="0" cy="509714"/>
           </a:xfrm>
           <a:prstGeom prst="line">
             <a:avLst/>
           </a:prstGeom>
+          <a:ln>
+            <a:prstDash val="dash"/>
+          </a:ln>
         </p:spPr>
         <p:style>
           <a:lnRef idx="1">
@@ -5394,26 +5100,27 @@
       </p:cxnSp>
       <p:cxnSp>
         <p:nvCxnSpPr>
-          <p:cNvPr id="75" name="直線コネクタ 74">
-            <a:extLst>
-              <a:ext uri="{FF2B5EF4-FFF2-40B4-BE49-F238E27FC236}">
-                <a16:creationId xmlns:a16="http://schemas.microsoft.com/office/drawing/2014/main" id="{44D75306-2BF5-455C-ABF8-34A1266AF028}"/>
-              </a:ext>
-            </a:extLst>
-          </p:cNvPr>
-          <p:cNvCxnSpPr>
-            <a:cxnSpLocks/>
-          </p:cNvCxnSpPr>
+          <p:cNvPr id="68" name="直線コネクタ 67">
+            <a:extLst>
+              <a:ext uri="{FF2B5EF4-FFF2-40B4-BE49-F238E27FC236}">
+                <a16:creationId xmlns:a16="http://schemas.microsoft.com/office/drawing/2014/main" id="{27350C5B-C46E-41FE-A073-0214128D40E0}"/>
+              </a:ext>
+            </a:extLst>
+          </p:cNvPr>
+          <p:cNvCxnSpPr/>
           <p:nvPr/>
         </p:nvCxnSpPr>
         <p:spPr>
-          <a:xfrm>
-            <a:off x="9093200" y="4985309"/>
-            <a:ext cx="0" cy="989383"/>
+          <a:xfrm flipV="1">
+            <a:off x="8520545" y="3316713"/>
+            <a:ext cx="0" cy="509714"/>
           </a:xfrm>
           <a:prstGeom prst="line">
             <a:avLst/>
           </a:prstGeom>
+          <a:ln>
+            <a:prstDash val="dash"/>
+          </a:ln>
         </p:spPr>
         <p:style>
           <a:lnRef idx="1">
@@ -5430,12 +5137,51 @@
           </a:fontRef>
         </p:style>
       </p:cxnSp>
-      <p:sp>
-        <p:nvSpPr>
-          <p:cNvPr id="57" name="テキスト ボックス 56">
-            <a:extLst>
-              <a:ext uri="{FF2B5EF4-FFF2-40B4-BE49-F238E27FC236}">
-                <a16:creationId xmlns:a16="http://schemas.microsoft.com/office/drawing/2014/main" id="{93DDDC77-5B11-45E4-AB14-D5B578C672B6}"/>
+      <p:cxnSp>
+        <p:nvCxnSpPr>
+          <p:cNvPr id="44" name="直線コネクタ 43">
+            <a:extLst>
+              <a:ext uri="{FF2B5EF4-FFF2-40B4-BE49-F238E27FC236}">
+                <a16:creationId xmlns:a16="http://schemas.microsoft.com/office/drawing/2014/main" id="{A49643F1-49AC-4AF0-A0FF-06CF74E5CE78}"/>
+              </a:ext>
+            </a:extLst>
+          </p:cNvPr>
+          <p:cNvCxnSpPr/>
+          <p:nvPr/>
+        </p:nvCxnSpPr>
+        <p:spPr>
+          <a:xfrm>
+            <a:off x="6243782" y="3315856"/>
+            <a:ext cx="2290618" cy="0"/>
+          </a:xfrm>
+          <a:prstGeom prst="line">
+            <a:avLst/>
+          </a:prstGeom>
+          <a:ln>
+            <a:prstDash val="dash"/>
+          </a:ln>
+        </p:spPr>
+        <p:style>
+          <a:lnRef idx="1">
+            <a:schemeClr val="accent1"/>
+          </a:lnRef>
+          <a:fillRef idx="0">
+            <a:schemeClr val="accent1"/>
+          </a:fillRef>
+          <a:effectRef idx="0">
+            <a:schemeClr val="accent1"/>
+          </a:effectRef>
+          <a:fontRef idx="minor">
+            <a:schemeClr val="tx1"/>
+          </a:fontRef>
+        </p:style>
+      </p:cxnSp>
+      <p:sp>
+        <p:nvSpPr>
+          <p:cNvPr id="45" name="テキスト ボックス 44">
+            <a:extLst>
+              <a:ext uri="{FF2B5EF4-FFF2-40B4-BE49-F238E27FC236}">
+                <a16:creationId xmlns:a16="http://schemas.microsoft.com/office/drawing/2014/main" id="{9C6390C4-546C-412C-8357-C9D3733A802F}"/>
               </a:ext>
             </a:extLst>
           </p:cNvPr>
@@ -5444,8 +5190,8 @@
         </p:nvSpPr>
         <p:spPr>
           <a:xfrm flipH="1">
-            <a:off x="6174510" y="3752452"/>
-            <a:ext cx="816560" cy="307777"/>
+            <a:off x="6048827" y="3021133"/>
+            <a:ext cx="2572108" cy="307777"/>
           </a:xfrm>
           <a:prstGeom prst="rect">
             <a:avLst/>
@@ -5459,18 +5205,63 @@
           <a:lstStyle/>
           <a:p>
             <a:r>
-              <a:rPr lang="en-US" sz="1400" dirty="0"/>
-              <a:t>Bound</a:t>
-            </a:r>
-          </a:p>
-        </p:txBody>
-      </p:sp>
-      <p:sp>
-        <p:nvSpPr>
-          <p:cNvPr id="79" name="テキスト ボックス 78">
-            <a:extLst>
-              <a:ext uri="{FF2B5EF4-FFF2-40B4-BE49-F238E27FC236}">
-                <a16:creationId xmlns:a16="http://schemas.microsoft.com/office/drawing/2014/main" id="{27645FD2-775F-4682-82EA-9C4D1CC6C884}"/>
+              <a:rPr lang="en-US" sz="1400" dirty="0">
+                <a:solidFill>
+                  <a:schemeClr val="accent1">
+                    <a:lumMod val="75000"/>
+                  </a:schemeClr>
+                </a:solidFill>
+              </a:rPr>
+              <a:t>Bound service for management</a:t>
+            </a:r>
+          </a:p>
+        </p:txBody>
+      </p:sp>
+      <p:cxnSp>
+        <p:nvCxnSpPr>
+          <p:cNvPr id="48" name="直線コネクタ 47">
+            <a:extLst>
+              <a:ext uri="{FF2B5EF4-FFF2-40B4-BE49-F238E27FC236}">
+                <a16:creationId xmlns:a16="http://schemas.microsoft.com/office/drawing/2014/main" id="{0D4B5E29-A73B-41E3-8CB3-CFBAE201247C}"/>
+              </a:ext>
+            </a:extLst>
+          </p:cNvPr>
+          <p:cNvCxnSpPr/>
+          <p:nvPr/>
+        </p:nvCxnSpPr>
+        <p:spPr>
+          <a:xfrm>
+            <a:off x="5569527" y="4502710"/>
+            <a:ext cx="0" cy="798088"/>
+          </a:xfrm>
+          <a:prstGeom prst="line">
+            <a:avLst/>
+          </a:prstGeom>
+          <a:ln>
+            <a:prstDash val="dash"/>
+          </a:ln>
+        </p:spPr>
+        <p:style>
+          <a:lnRef idx="1">
+            <a:schemeClr val="accent1"/>
+          </a:lnRef>
+          <a:fillRef idx="0">
+            <a:schemeClr val="accent1"/>
+          </a:fillRef>
+          <a:effectRef idx="0">
+            <a:schemeClr val="accent1"/>
+          </a:effectRef>
+          <a:fontRef idx="minor">
+            <a:schemeClr val="tx1"/>
+          </a:fontRef>
+        </p:style>
+      </p:cxnSp>
+      <p:sp>
+        <p:nvSpPr>
+          <p:cNvPr id="76" name="テキスト ボックス 75">
+            <a:extLst>
+              <a:ext uri="{FF2B5EF4-FFF2-40B4-BE49-F238E27FC236}">
+                <a16:creationId xmlns:a16="http://schemas.microsoft.com/office/drawing/2014/main" id="{49BA0B35-80BB-4CD3-A356-613C449DFF88}"/>
               </a:ext>
             </a:extLst>
           </p:cNvPr>
@@ -5479,8 +5270,8 @@
         </p:nvSpPr>
         <p:spPr>
           <a:xfrm flipH="1">
-            <a:off x="9114398" y="5380993"/>
-            <a:ext cx="816560" cy="307777"/>
+            <a:off x="6981994" y="3522632"/>
+            <a:ext cx="1275086" cy="307777"/>
           </a:xfrm>
           <a:prstGeom prst="rect">
             <a:avLst/>
@@ -5494,9 +5285,22 @@
           <a:lstStyle/>
           <a:p>
             <a:r>
-              <a:rPr lang="en-US" sz="1400" dirty="0"/>
-              <a:t>Bound</a:t>
-            </a:r>
+              <a:rPr lang="en-US" sz="1400" dirty="0" err="1">
+                <a:solidFill>
+                  <a:schemeClr val="accent1">
+                    <a:lumMod val="75000"/>
+                  </a:schemeClr>
+                </a:solidFill>
+              </a:rPr>
+              <a:t>EventBus</a:t>
+            </a:r>
+            <a:endParaRPr lang="en-US" sz="1400" dirty="0">
+              <a:solidFill>
+                <a:schemeClr val="accent1">
+                  <a:lumMod val="75000"/>
+                </a:schemeClr>
+              </a:solidFill>
+            </a:endParaRPr>
           </a:p>
         </p:txBody>
       </p:sp>

</xml_diff>